<commit_message>
added a more robust front end
</commit_message>
<xml_diff>
--- a/Climate Change.pptx
+++ b/Climate Change.pptx
@@ -5,11 +5,13 @@
     <p:sldMasterId id="2147483744" r:id="rId1"/>
   </p:sldMasterIdLst>
   <p:notesMasterIdLst>
-    <p:notesMasterId r:id="rId4"/>
+    <p:notesMasterId r:id="rId6"/>
   </p:notesMasterIdLst>
   <p:sldIdLst>
     <p:sldId id="258" r:id="rId2"/>
     <p:sldId id="259" r:id="rId3"/>
+    <p:sldId id="261" r:id="rId4"/>
+    <p:sldId id="262" r:id="rId5"/>
   </p:sldIdLst>
   <p:sldSz cx="12192000" cy="6858000"/>
   <p:notesSz cx="6858000" cy="9144000"/>
@@ -138,6 +140,14 @@
       </a:defRPr>
     </a:lvl9pPr>
   </p:defaultTextStyle>
+  <p:extLst>
+    <p:ext uri="{EFAFB233-063F-42B5-8137-9DF3F51BA10A}">
+      <p15:sldGuideLst xmlns:p15="http://schemas.microsoft.com/office/powerpoint/2012/main"/>
+    </p:ext>
+    <p:ext uri="{2D200454-40CA-4A62-9FC3-DE9A4176ACB9}">
+      <p15:notesGuideLst xmlns:p15="http://schemas.microsoft.com/office/powerpoint/2012/main"/>
+    </p:ext>
+  </p:extLst>
 </p:presentation>
 </file>
 
@@ -223,7 +233,7 @@
           <a:p>
             <a:fld id="{9E2836F3-7F38-404F-A7F6-9D8897BC29B6}" type="datetimeFigureOut">
               <a:rPr lang="en-US" smtClean="0"/>
-              <a:t>9/19/2018</a:t>
+              <a:t>9/24/2018</a:t>
             </a:fld>
             <a:endParaRPr lang="en-US"/>
           </a:p>
@@ -641,7 +651,7 @@
           <a:p>
             <a:fld id="{DEDAAE1C-97DC-4285-8FA9-2DC1FB370642}" type="datetimeFigureOut">
               <a:rPr lang="en-US" smtClean="0"/>
-              <a:t>9/19/2018</a:t>
+              <a:t>9/24/2018</a:t>
             </a:fld>
             <a:endParaRPr lang="en-US"/>
           </a:p>
@@ -851,7 +861,7 @@
           <a:p>
             <a:fld id="{DEDAAE1C-97DC-4285-8FA9-2DC1FB370642}" type="datetimeFigureOut">
               <a:rPr lang="en-US" smtClean="0"/>
-              <a:t>9/19/2018</a:t>
+              <a:t>9/24/2018</a:t>
             </a:fld>
             <a:endParaRPr lang="en-US"/>
           </a:p>
@@ -1071,7 +1081,7 @@
           <a:p>
             <a:fld id="{DEDAAE1C-97DC-4285-8FA9-2DC1FB370642}" type="datetimeFigureOut">
               <a:rPr lang="en-US" smtClean="0"/>
-              <a:t>9/19/2018</a:t>
+              <a:t>9/24/2018</a:t>
             </a:fld>
             <a:endParaRPr lang="en-US"/>
           </a:p>
@@ -1281,7 +1291,7 @@
           <a:p>
             <a:fld id="{DEDAAE1C-97DC-4285-8FA9-2DC1FB370642}" type="datetimeFigureOut">
               <a:rPr lang="en-US" smtClean="0"/>
-              <a:t>9/19/2018</a:t>
+              <a:t>9/24/2018</a:t>
             </a:fld>
             <a:endParaRPr lang="en-US"/>
           </a:p>
@@ -1514,7 +1524,7 @@
           <a:p>
             <a:fld id="{DEDAAE1C-97DC-4285-8FA9-2DC1FB370642}" type="datetimeFigureOut">
               <a:rPr lang="en-US" smtClean="0"/>
-              <a:t>9/19/2018</a:t>
+              <a:t>9/24/2018</a:t>
             </a:fld>
             <a:endParaRPr lang="en-US"/>
           </a:p>
@@ -1791,7 +1801,7 @@
           <a:p>
             <a:fld id="{DEDAAE1C-97DC-4285-8FA9-2DC1FB370642}" type="datetimeFigureOut">
               <a:rPr lang="en-US" smtClean="0"/>
-              <a:t>9/19/2018</a:t>
+              <a:t>9/24/2018</a:t>
             </a:fld>
             <a:endParaRPr lang="en-US"/>
           </a:p>
@@ -2215,7 +2225,7 @@
           <a:p>
             <a:fld id="{DEDAAE1C-97DC-4285-8FA9-2DC1FB370642}" type="datetimeFigureOut">
               <a:rPr lang="en-US" smtClean="0"/>
-              <a:t>9/19/2018</a:t>
+              <a:t>9/24/2018</a:t>
             </a:fld>
             <a:endParaRPr lang="en-US"/>
           </a:p>
@@ -2368,7 +2378,7 @@
           <a:p>
             <a:fld id="{DEDAAE1C-97DC-4285-8FA9-2DC1FB370642}" type="datetimeFigureOut">
               <a:rPr lang="en-US" smtClean="0"/>
-              <a:t>9/19/2018</a:t>
+              <a:t>9/24/2018</a:t>
             </a:fld>
             <a:endParaRPr lang="en-US"/>
           </a:p>
@@ -2493,7 +2503,7 @@
           <a:p>
             <a:fld id="{DEDAAE1C-97DC-4285-8FA9-2DC1FB370642}" type="datetimeFigureOut">
               <a:rPr lang="en-US" smtClean="0"/>
-              <a:t>9/19/2018</a:t>
+              <a:t>9/24/2018</a:t>
             </a:fld>
             <a:endParaRPr lang="en-US"/>
           </a:p>
@@ -2816,7 +2826,7 @@
           <a:p>
             <a:fld id="{DEDAAE1C-97DC-4285-8FA9-2DC1FB370642}" type="datetimeFigureOut">
               <a:rPr lang="en-US" smtClean="0"/>
-              <a:t>9/19/2018</a:t>
+              <a:t>9/24/2018</a:t>
             </a:fld>
             <a:endParaRPr lang="en-US"/>
           </a:p>
@@ -3119,7 +3129,7 @@
           <a:p>
             <a:fld id="{DEDAAE1C-97DC-4285-8FA9-2DC1FB370642}" type="datetimeFigureOut">
               <a:rPr lang="en-US" smtClean="0"/>
-              <a:t>9/19/2018</a:t>
+              <a:t>9/24/2018</a:t>
             </a:fld>
             <a:endParaRPr lang="en-US"/>
           </a:p>
@@ -3477,7 +3487,7 @@
           <a:p>
             <a:fld id="{DEDAAE1C-97DC-4285-8FA9-2DC1FB370642}" type="datetimeFigureOut">
               <a:rPr lang="en-US" smtClean="0"/>
-              <a:t>9/19/2018</a:t>
+              <a:t>9/24/2018</a:t>
             </a:fld>
             <a:endParaRPr lang="en-US"/>
           </a:p>
@@ -4135,8 +4145,8 @@
         </p:blipFill>
         <p:spPr>
           <a:xfrm>
-            <a:off x="3091971" y="1781175"/>
-            <a:ext cx="5524500" cy="2686050"/>
+            <a:off x="2331721" y="1046192"/>
+            <a:ext cx="7658099" cy="3502025"/>
           </a:xfrm>
           <a:prstGeom prst="rect">
             <a:avLst/>
@@ -4157,8 +4167,8 @@
         </p:nvSpPr>
         <p:spPr>
           <a:xfrm>
-            <a:off x="496389" y="1210491"/>
-            <a:ext cx="2595582" cy="369332"/>
+            <a:off x="525311" y="1046192"/>
+            <a:ext cx="1676869" cy="830997"/>
           </a:xfrm>
           <a:prstGeom prst="rect">
             <a:avLst/>
@@ -4172,8 +4182,28 @@
           <a:lstStyle/>
           <a:p>
             <a:r>
-              <a:rPr lang="en-US" dirty="0"/>
-              <a:t>The story in two acts….</a:t>
+              <a:rPr lang="en-US" sz="2400" b="1" i="1" dirty="0">
+                <a:solidFill>
+                  <a:srgbClr val="FFC000"/>
+                </a:solidFill>
+                <a:latin typeface="+mj-lt"/>
+                <a:ea typeface="+mj-ea"/>
+                <a:cs typeface="+mj-cs"/>
+              </a:rPr>
+              <a:t>A story in </a:t>
+            </a:r>
+          </a:p>
+          <a:p>
+            <a:r>
+              <a:rPr lang="en-US" sz="2400" b="1" i="1" dirty="0">
+                <a:solidFill>
+                  <a:srgbClr val="FFC000"/>
+                </a:solidFill>
+                <a:latin typeface="+mj-lt"/>
+                <a:ea typeface="+mj-ea"/>
+                <a:cs typeface="+mj-cs"/>
+              </a:rPr>
+              <a:t>two acts:</a:t>
             </a:r>
           </a:p>
         </p:txBody>
@@ -4226,8 +4256,8 @@
         </p:nvSpPr>
         <p:spPr>
           <a:xfrm>
-            <a:off x="609600" y="274638"/>
-            <a:ext cx="10972800" cy="726848"/>
+            <a:off x="609600" y="261798"/>
+            <a:ext cx="10972800" cy="512762"/>
           </a:xfrm>
         </p:spPr>
         <p:txBody>
@@ -4263,7 +4293,7 @@
         </p:nvSpPr>
         <p:spPr>
           <a:xfrm>
-            <a:off x="609600" y="1166018"/>
+            <a:off x="787400" y="1002506"/>
             <a:ext cx="10972800" cy="4525963"/>
           </a:xfrm>
         </p:spPr>
@@ -4276,95 +4306,42 @@
             </a:pPr>
             <a:r>
               <a:rPr lang="en-US" sz="1400" dirty="0"/>
-              <a:t>Data: </a:t>
-            </a:r>
-          </a:p>
-          <a:p>
-            <a:pPr marL="0" indent="0">
-              <a:buNone/>
-            </a:pPr>
-            <a:r>
-              <a:rPr lang="en-US" sz="1400" dirty="0"/>
-              <a:t>	Global surface temperature changes from 1880-2017 by hemisphere zone (</a:t>
-            </a:r>
-            <a:r>
-              <a:rPr lang="en-US" sz="1400" dirty="0">
+              <a:t>		</a:t>
+            </a:r>
+            <a:r>
+              <a:rPr lang="en-US" sz="1400" b="1" dirty="0"/>
+              <a:t>Global surface temperature anomalies from 1880-2017 by zone (</a:t>
+            </a:r>
+            <a:r>
+              <a:rPr lang="en-US" sz="1400" b="1" dirty="0">
                 <a:hlinkClick r:id="rId2"/>
               </a:rPr>
               <a:t>https://data.giss.nasa.gov/gistemp</a:t>
             </a:r>
             <a:r>
+              <a:rPr lang="en-US" sz="1400" b="1" dirty="0"/>
+              <a:t>)</a:t>
+            </a:r>
+          </a:p>
+          <a:p>
+            <a:pPr marL="0" indent="0">
+              <a:buNone/>
+            </a:pPr>
+            <a:r>
               <a:rPr lang="en-US" sz="1400" dirty="0"/>
-              <a:t>)</a:t>
-            </a:r>
-          </a:p>
-          <a:p>
-            <a:pPr marL="0" indent="0">
-              <a:buNone/>
-            </a:pPr>
-            <a:r>
-              <a:rPr lang="en-US" sz="1400" dirty="0"/>
-              <a:t>	List of national capitals </a:t>
-            </a:r>
-            <a:r>
-              <a:rPr lang="en-US" sz="1400" dirty="0">
+              <a:t>		</a:t>
+            </a:r>
+            <a:r>
+              <a:rPr lang="en-US" sz="1400" b="1" dirty="0"/>
+              <a:t>List of national capitals </a:t>
+            </a:r>
+            <a:r>
+              <a:rPr lang="en-US" sz="1400" b="1" dirty="0">
                 <a:hlinkClick r:id="rId3"/>
               </a:rPr>
               <a:t>https://en.wikipedia.org/wiki/List_of_national_capitals_by_latitude</a:t>
             </a:r>
-            <a:endParaRPr lang="en-US" sz="1400" dirty="0"/>
-          </a:p>
-          <a:p>
-            <a:pPr marL="0" indent="0">
-              <a:buNone/>
-            </a:pPr>
-            <a:r>
-              <a:rPr lang="en-US" sz="1400" dirty="0"/>
-              <a:t>Methods:</a:t>
-            </a:r>
-          </a:p>
-          <a:p>
-            <a:pPr marL="0" indent="0">
-              <a:buNone/>
-            </a:pPr>
-            <a:r>
-              <a:rPr lang="en-US" sz="1400" dirty="0"/>
-              <a:t>	Used the google geocode API to find the latitude and longitude of the capitals and determine which zone they were in.  </a:t>
-            </a:r>
-          </a:p>
-          <a:p>
-            <a:pPr marL="0" indent="0">
-              <a:buNone/>
-            </a:pPr>
-            <a:r>
-              <a:rPr lang="en-US" sz="1400" dirty="0"/>
-              <a:t>	Combined the two datasets together and summarized the anomalies into 30 year buckets and created/inserted into MongoDB</a:t>
-            </a:r>
-          </a:p>
-          <a:p>
-            <a:pPr marL="0" indent="0">
-              <a:buNone/>
-            </a:pPr>
-            <a:r>
-              <a:rPr lang="en-US" sz="1400" dirty="0"/>
-              <a:t>	Used Flash for storage and retrieval and rendering the html with </a:t>
-            </a:r>
-            <a:r>
-              <a:rPr lang="en-US" sz="1400" dirty="0" err="1"/>
-              <a:t>javascript</a:t>
-            </a:r>
-            <a:r>
-              <a:rPr lang="en-US" sz="1400" dirty="0"/>
-              <a:t> to create the </a:t>
-            </a:r>
-            <a:r>
-              <a:rPr lang="en-US" sz="1400" dirty="0" err="1"/>
-              <a:t>leafletmap</a:t>
-            </a:r>
-            <a:r>
-              <a:rPr lang="en-US" sz="1400" dirty="0"/>
-              <a:t>.</a:t>
-            </a:r>
+            <a:endParaRPr lang="en-US" sz="1400" b="1" dirty="0"/>
           </a:p>
           <a:p>
             <a:pPr marL="0" indent="0">
@@ -4377,6 +4354,208 @@
               <a:buNone/>
             </a:pPr>
             <a:endParaRPr lang="en-US" sz="1400" dirty="0"/>
+          </a:p>
+          <a:p>
+            <a:pPr marL="0" indent="0">
+              <a:buNone/>
+            </a:pPr>
+            <a:endParaRPr lang="en-US" sz="1400" dirty="0"/>
+          </a:p>
+          <a:p>
+            <a:pPr marL="0" indent="0">
+              <a:buNone/>
+            </a:pPr>
+            <a:endParaRPr lang="en-US" sz="1400" dirty="0"/>
+          </a:p>
+          <a:p>
+            <a:pPr marL="0" indent="0">
+              <a:buNone/>
+            </a:pPr>
+            <a:endParaRPr lang="en-US" sz="1400" dirty="0"/>
+          </a:p>
+          <a:p>
+            <a:pPr marL="0" indent="0">
+              <a:buNone/>
+            </a:pPr>
+            <a:endParaRPr lang="en-US" sz="1400" dirty="0"/>
+          </a:p>
+        </p:txBody>
+      </p:sp>
+      <p:pic>
+        <p:nvPicPr>
+          <p:cNvPr id="4" name="Picture 3"/>
+          <p:cNvPicPr>
+            <a:picLocks noChangeAspect="1"/>
+          </p:cNvPicPr>
+          <p:nvPr/>
+        </p:nvPicPr>
+        <p:blipFill>
+          <a:blip r:embed="rId4"/>
+          <a:stretch>
+            <a:fillRect/>
+          </a:stretch>
+        </p:blipFill>
+        <p:spPr>
+          <a:xfrm>
+            <a:off x="2678112" y="1710392"/>
+            <a:ext cx="7877175" cy="3333750"/>
+          </a:xfrm>
+          <a:prstGeom prst="rect">
+            <a:avLst/>
+          </a:prstGeom>
+        </p:spPr>
+      </p:pic>
+      <p:sp>
+        <p:nvSpPr>
+          <p:cNvPr id="5" name="Rectangle 4"/>
+          <p:cNvSpPr/>
+          <p:nvPr/>
+        </p:nvSpPr>
+        <p:spPr>
+          <a:xfrm>
+            <a:off x="609600" y="1002506"/>
+            <a:ext cx="1501775" cy="707886"/>
+          </a:xfrm>
+          <a:prstGeom prst="rect">
+            <a:avLst/>
+          </a:prstGeom>
+        </p:spPr>
+        <p:txBody>
+          <a:bodyPr wrap="square">
+            <a:spAutoFit/>
+          </a:bodyPr>
+          <a:lstStyle/>
+          <a:p>
+            <a:pPr marL="0" indent="0">
+              <a:buNone/>
+            </a:pPr>
+            <a:r>
+              <a:rPr lang="en-US" sz="2000" b="1" i="1" dirty="0">
+                <a:solidFill>
+                  <a:srgbClr val="FFC000"/>
+                </a:solidFill>
+              </a:rPr>
+              <a:t>Data Sources:</a:t>
+            </a:r>
+            <a:endParaRPr lang="en-US" sz="2000" b="1" dirty="0">
+              <a:latin typeface="+mn-lt"/>
+            </a:endParaRPr>
+          </a:p>
+        </p:txBody>
+      </p:sp>
+      <p:sp>
+        <p:nvSpPr>
+          <p:cNvPr id="6" name="Rectangle 1">
+            <a:extLst>
+              <a:ext uri="{FF2B5EF4-FFF2-40B4-BE49-F238E27FC236}">
+                <a16:creationId xmlns:a16="http://schemas.microsoft.com/office/drawing/2014/main" id="{E3B2A92D-EE3D-41F8-A895-9BEB0685B3DA}"/>
+              </a:ext>
+            </a:extLst>
+          </p:cNvPr>
+          <p:cNvSpPr>
+            <a:spLocks noChangeArrowheads="1"/>
+          </p:cNvSpPr>
+          <p:nvPr/>
+        </p:nvSpPr>
+        <p:spPr bwMode="auto">
+          <a:xfrm>
+            <a:off x="2601100" y="5292070"/>
+            <a:ext cx="12192000" cy="0"/>
+          </a:xfrm>
+          <a:prstGeom prst="rect">
+            <a:avLst/>
+          </a:prstGeom>
+          <a:solidFill>
+            <a:srgbClr val="FFFFFF"/>
+          </a:solidFill>
+          <a:ln>
+            <a:noFill/>
+          </a:ln>
+          <a:effectLst/>
+          <a:extLst>
+            <a:ext uri="{91240B29-F687-4F45-9708-019B960494DF}">
+              <a14:hiddenLine xmlns:a14="http://schemas.microsoft.com/office/drawing/2010/main" w="9525">
+                <a:solidFill>
+                  <a:schemeClr val="tx1"/>
+                </a:solidFill>
+                <a:miter lim="800000"/>
+                <a:headEnd/>
+                <a:tailEnd/>
+              </a14:hiddenLine>
+            </a:ext>
+            <a:ext uri="{AF507438-7753-43E0-B8FC-AC1667EBCBE1}">
+              <a14:hiddenEffects xmlns:a14="http://schemas.microsoft.com/office/drawing/2010/main">
+                <a:effectLst>
+                  <a:outerShdw dist="35921" dir="2700000" algn="ctr" rotWithShape="0">
+                    <a:schemeClr val="bg2"/>
+                  </a:outerShdw>
+                </a:effectLst>
+              </a14:hiddenEffects>
+            </a:ext>
+          </a:extLst>
+        </p:spPr>
+        <p:txBody>
+          <a:bodyPr vert="horz" wrap="square" lIns="91440" tIns="45720" rIns="91440" bIns="45720" numCol="1" anchor="ctr" anchorCtr="0" compatLnSpc="1">
+            <a:prstTxWarp prst="textNoShape">
+              <a:avLst/>
+            </a:prstTxWarp>
+            <a:spAutoFit/>
+          </a:bodyPr>
+          <a:lstStyle/>
+          <a:p>
+            <a:pPr marL="0" marR="0" lvl="0" indent="0" algn="l" defTabSz="914400" rtl="0" eaLnBrk="0" fontAlgn="base" latinLnBrk="0" hangingPunct="0">
+              <a:lnSpc>
+                <a:spcPct val="100000"/>
+              </a:lnSpc>
+              <a:spcBef>
+                <a:spcPct val="0"/>
+              </a:spcBef>
+              <a:spcAft>
+                <a:spcPct val="0"/>
+              </a:spcAft>
+              <a:buClrTx/>
+              <a:buSzTx/>
+              <a:buFontTx/>
+              <a:buNone/>
+              <a:tabLst/>
+            </a:pPr>
+            <a:r>
+              <a:rPr kumimoji="0" lang="en-US" altLang="en-US" sz="1800" b="0" i="0" u="none" strike="noStrike" cap="none" normalizeH="0" baseline="0" dirty="0">
+                <a:ln>
+                  <a:noFill/>
+                </a:ln>
+                <a:solidFill>
+                  <a:srgbClr val="1155CC"/>
+                </a:solidFill>
+                <a:effectLst/>
+                <a:latin typeface="Arial" panose="020B0604020202020204" pitchFamily="34" charset="0"/>
+                <a:cs typeface="Arial" panose="020B0604020202020204" pitchFamily="34" charset="0"/>
+                <a:hlinkClick r:id="rId5"/>
+              </a:rPr>
+              <a:t>https://twitter.com/anttilip/status/1033342041474969601?s=03</a:t>
+            </a:r>
+            <a:r>
+              <a:rPr kumimoji="0" lang="en-US" altLang="en-US" sz="1800" b="0" i="0" u="none" strike="noStrike" cap="none" normalizeH="0" baseline="0" dirty="0">
+                <a:ln>
+                  <a:noFill/>
+                </a:ln>
+                <a:solidFill>
+                  <a:schemeClr val="tx1"/>
+                </a:solidFill>
+                <a:effectLst/>
+              </a:rPr>
+              <a:t> </a:t>
+            </a:r>
+            <a:endParaRPr kumimoji="0" lang="en-US" altLang="en-US" sz="1800" b="0" i="0" u="none" strike="noStrike" cap="none" normalizeH="0" baseline="0" dirty="0">
+              <a:ln>
+                <a:noFill/>
+              </a:ln>
+              <a:solidFill>
+                <a:schemeClr val="tx1"/>
+              </a:solidFill>
+              <a:effectLst/>
+              <a:latin typeface="Arial" panose="020B0604020202020204" pitchFamily="34" charset="0"/>
+            </a:endParaRPr>
           </a:p>
         </p:txBody>
       </p:sp>
@@ -4384,6 +4563,777 @@
     <p:extLst>
       <p:ext uri="{BB962C8B-B14F-4D97-AF65-F5344CB8AC3E}">
         <p14:creationId xmlns:p14="http://schemas.microsoft.com/office/powerpoint/2010/main" val="3681048620"/>
+      </p:ext>
+    </p:extLst>
+  </p:cSld>
+  <p:clrMapOvr>
+    <a:masterClrMapping/>
+  </p:clrMapOvr>
+</p:sld>
+</file>
+
+<file path=ppt/slides/slide3.xml><?xml version="1.0" encoding="utf-8"?>
+<p:sld xmlns:a="http://schemas.openxmlformats.org/drawingml/2006/main" xmlns:r="http://schemas.openxmlformats.org/officeDocument/2006/relationships" xmlns:p="http://schemas.openxmlformats.org/presentationml/2006/main">
+  <p:cSld>
+    <p:spTree>
+      <p:nvGrpSpPr>
+        <p:cNvPr id="1" name=""/>
+        <p:cNvGrpSpPr/>
+        <p:nvPr/>
+      </p:nvGrpSpPr>
+      <p:grpSpPr>
+        <a:xfrm>
+          <a:off x="0" y="0"/>
+          <a:ext cx="0" cy="0"/>
+          <a:chOff x="0" y="0"/>
+          <a:chExt cx="0" cy="0"/>
+        </a:xfrm>
+      </p:grpSpPr>
+      <p:sp>
+        <p:nvSpPr>
+          <p:cNvPr id="2" name="Rectangle 1"/>
+          <p:cNvSpPr/>
+          <p:nvPr/>
+        </p:nvSpPr>
+        <p:spPr>
+          <a:xfrm>
+            <a:off x="2614612" y="1016882"/>
+            <a:ext cx="11620500" cy="307777"/>
+          </a:xfrm>
+          <a:prstGeom prst="rect">
+            <a:avLst/>
+          </a:prstGeom>
+        </p:spPr>
+        <p:txBody>
+          <a:bodyPr wrap="square">
+            <a:spAutoFit/>
+          </a:bodyPr>
+          <a:lstStyle/>
+          <a:p>
+            <a:pPr marL="0" indent="0">
+              <a:buNone/>
+            </a:pPr>
+            <a:r>
+              <a:rPr lang="en-US" sz="1400" b="1" dirty="0">
+                <a:latin typeface="+mn-lt"/>
+              </a:rPr>
+              <a:t>Determine the zone based on Latitude</a:t>
+            </a:r>
+          </a:p>
+        </p:txBody>
+      </p:sp>
+      <p:pic>
+        <p:nvPicPr>
+          <p:cNvPr id="3" name="Picture 2"/>
+          <p:cNvPicPr>
+            <a:picLocks noChangeAspect="1"/>
+          </p:cNvPicPr>
+          <p:nvPr/>
+        </p:nvPicPr>
+        <p:blipFill>
+          <a:blip r:embed="rId2"/>
+          <a:stretch>
+            <a:fillRect/>
+          </a:stretch>
+        </p:blipFill>
+        <p:spPr>
+          <a:xfrm>
+            <a:off x="2700337" y="1324659"/>
+            <a:ext cx="7524750" cy="752475"/>
+          </a:xfrm>
+          <a:prstGeom prst="rect">
+            <a:avLst/>
+          </a:prstGeom>
+        </p:spPr>
+      </p:pic>
+      <p:sp>
+        <p:nvSpPr>
+          <p:cNvPr id="4" name="Rectangle 3"/>
+          <p:cNvSpPr/>
+          <p:nvPr/>
+        </p:nvSpPr>
+        <p:spPr>
+          <a:xfrm>
+            <a:off x="720725" y="970716"/>
+            <a:ext cx="1501775" cy="707886"/>
+          </a:xfrm>
+          <a:prstGeom prst="rect">
+            <a:avLst/>
+          </a:prstGeom>
+        </p:spPr>
+        <p:txBody>
+          <a:bodyPr wrap="square">
+            <a:spAutoFit/>
+          </a:bodyPr>
+          <a:lstStyle/>
+          <a:p>
+            <a:pPr marL="0" indent="0">
+              <a:buNone/>
+            </a:pPr>
+            <a:r>
+              <a:rPr lang="en-US" sz="2000" b="1" i="1" dirty="0">
+                <a:solidFill>
+                  <a:srgbClr val="FFC000"/>
+                </a:solidFill>
+              </a:rPr>
+              <a:t>Code </a:t>
+            </a:r>
+          </a:p>
+          <a:p>
+            <a:pPr marL="0" indent="0">
+              <a:buNone/>
+            </a:pPr>
+            <a:r>
+              <a:rPr lang="en-US" sz="2000" b="1" i="1" dirty="0">
+                <a:solidFill>
+                  <a:srgbClr val="FFC000"/>
+                </a:solidFill>
+              </a:rPr>
+              <a:t>Highlights</a:t>
+            </a:r>
+            <a:endParaRPr lang="en-US" sz="2000" b="1" dirty="0">
+              <a:latin typeface="+mn-lt"/>
+            </a:endParaRPr>
+          </a:p>
+        </p:txBody>
+      </p:sp>
+      <p:pic>
+        <p:nvPicPr>
+          <p:cNvPr id="5" name="Picture 4"/>
+          <p:cNvPicPr>
+            <a:picLocks noChangeAspect="1"/>
+          </p:cNvPicPr>
+          <p:nvPr/>
+        </p:nvPicPr>
+        <p:blipFill>
+          <a:blip r:embed="rId3"/>
+          <a:stretch>
+            <a:fillRect/>
+          </a:stretch>
+        </p:blipFill>
+        <p:spPr>
+          <a:xfrm>
+            <a:off x="2700337" y="2490099"/>
+            <a:ext cx="6677025" cy="1819275"/>
+          </a:xfrm>
+          <a:prstGeom prst="rect">
+            <a:avLst/>
+          </a:prstGeom>
+        </p:spPr>
+      </p:pic>
+      <p:sp>
+        <p:nvSpPr>
+          <p:cNvPr id="6" name="Rectangle 5"/>
+          <p:cNvSpPr/>
+          <p:nvPr/>
+        </p:nvSpPr>
+        <p:spPr>
+          <a:xfrm>
+            <a:off x="2614612" y="2205630"/>
+            <a:ext cx="11620500" cy="307777"/>
+          </a:xfrm>
+          <a:prstGeom prst="rect">
+            <a:avLst/>
+          </a:prstGeom>
+        </p:spPr>
+        <p:txBody>
+          <a:bodyPr wrap="square">
+            <a:spAutoFit/>
+          </a:bodyPr>
+          <a:lstStyle/>
+          <a:p>
+            <a:pPr marL="0" indent="0">
+              <a:buNone/>
+            </a:pPr>
+            <a:r>
+              <a:rPr lang="en-US" sz="1400" b="1" dirty="0">
+                <a:latin typeface="+mn-lt"/>
+              </a:rPr>
+              <a:t>Had to transpose the </a:t>
+            </a:r>
+            <a:r>
+              <a:rPr lang="en-US" sz="1400" b="1" dirty="0" err="1">
+                <a:latin typeface="+mn-lt"/>
+              </a:rPr>
+              <a:t>dataframe</a:t>
+            </a:r>
+            <a:r>
+              <a:rPr lang="en-US" sz="1400" b="1" dirty="0">
+                <a:latin typeface="+mn-lt"/>
+              </a:rPr>
+              <a:t> and rename the 120 + columns to the respective year before merging</a:t>
+            </a:r>
+          </a:p>
+        </p:txBody>
+      </p:sp>
+      <p:pic>
+        <p:nvPicPr>
+          <p:cNvPr id="7" name="Picture 6"/>
+          <p:cNvPicPr>
+            <a:picLocks noChangeAspect="1"/>
+          </p:cNvPicPr>
+          <p:nvPr/>
+        </p:nvPicPr>
+        <p:blipFill>
+          <a:blip r:embed="rId4"/>
+          <a:stretch>
+            <a:fillRect/>
+          </a:stretch>
+        </p:blipFill>
+        <p:spPr>
+          <a:xfrm>
+            <a:off x="2700337" y="4780686"/>
+            <a:ext cx="5895975" cy="1028700"/>
+          </a:xfrm>
+          <a:prstGeom prst="rect">
+            <a:avLst/>
+          </a:prstGeom>
+        </p:spPr>
+      </p:pic>
+      <p:sp>
+        <p:nvSpPr>
+          <p:cNvPr id="8" name="Rectangle 7"/>
+          <p:cNvSpPr/>
+          <p:nvPr/>
+        </p:nvSpPr>
+        <p:spPr>
+          <a:xfrm>
+            <a:off x="2614612" y="4466632"/>
+            <a:ext cx="7820025" cy="307777"/>
+          </a:xfrm>
+          <a:prstGeom prst="rect">
+            <a:avLst/>
+          </a:prstGeom>
+        </p:spPr>
+        <p:txBody>
+          <a:bodyPr wrap="square">
+            <a:spAutoFit/>
+          </a:bodyPr>
+          <a:lstStyle/>
+          <a:p>
+            <a:pPr marL="0" indent="0">
+              <a:buNone/>
+            </a:pPr>
+            <a:r>
+              <a:rPr lang="en-US" sz="1400" b="1" dirty="0">
+                <a:latin typeface="+mn-lt"/>
+              </a:rPr>
+              <a:t>Created ranges by summing multiple columns. The were used as the layers on the map</a:t>
+            </a:r>
+          </a:p>
+        </p:txBody>
+      </p:sp>
+      <p:sp>
+        <p:nvSpPr>
+          <p:cNvPr id="9" name="Title 1">
+            <a:extLst>
+              <a:ext uri="{FF2B5EF4-FFF2-40B4-BE49-F238E27FC236}">
+                <a16:creationId xmlns:a16="http://schemas.microsoft.com/office/drawing/2014/main" id="{C0948C8C-659B-4847-BCDE-A451CDC4881C}"/>
+              </a:ext>
+            </a:extLst>
+          </p:cNvPr>
+          <p:cNvSpPr txBox="1">
+            <a:spLocks/>
+          </p:cNvSpPr>
+          <p:nvPr/>
+        </p:nvSpPr>
+        <p:spPr>
+          <a:xfrm>
+            <a:off x="596900" y="111575"/>
+            <a:ext cx="10972800" cy="512762"/>
+          </a:xfrm>
+          <a:prstGeom prst="rect">
+            <a:avLst/>
+          </a:prstGeom>
+        </p:spPr>
+        <p:txBody>
+          <a:bodyPr/>
+          <a:lstStyle>
+            <a:lvl1pPr algn="ctr" rtl="0" eaLnBrk="1" fontAlgn="base" hangingPunct="1">
+              <a:spcBef>
+                <a:spcPct val="0"/>
+              </a:spcBef>
+              <a:spcAft>
+                <a:spcPct val="0"/>
+              </a:spcAft>
+              <a:defRPr sz="4400" kern="1200">
+                <a:solidFill>
+                  <a:schemeClr val="tx2"/>
+                </a:solidFill>
+                <a:latin typeface="+mj-lt"/>
+                <a:ea typeface="+mj-ea"/>
+                <a:cs typeface="+mj-cs"/>
+              </a:defRPr>
+            </a:lvl1pPr>
+            <a:lvl2pPr algn="ctr" rtl="0" eaLnBrk="1" fontAlgn="base" hangingPunct="1">
+              <a:spcBef>
+                <a:spcPct val="0"/>
+              </a:spcBef>
+              <a:spcAft>
+                <a:spcPct val="0"/>
+              </a:spcAft>
+              <a:defRPr sz="4400">
+                <a:solidFill>
+                  <a:schemeClr val="tx2"/>
+                </a:solidFill>
+                <a:latin typeface="Arial" panose="020B0604020202020204" pitchFamily="34" charset="0"/>
+                <a:cs typeface="Arial" panose="020B0604020202020204" pitchFamily="34" charset="0"/>
+              </a:defRPr>
+            </a:lvl2pPr>
+            <a:lvl3pPr algn="ctr" rtl="0" eaLnBrk="1" fontAlgn="base" hangingPunct="1">
+              <a:spcBef>
+                <a:spcPct val="0"/>
+              </a:spcBef>
+              <a:spcAft>
+                <a:spcPct val="0"/>
+              </a:spcAft>
+              <a:defRPr sz="4400">
+                <a:solidFill>
+                  <a:schemeClr val="tx2"/>
+                </a:solidFill>
+                <a:latin typeface="Arial" panose="020B0604020202020204" pitchFamily="34" charset="0"/>
+                <a:cs typeface="Arial" panose="020B0604020202020204" pitchFamily="34" charset="0"/>
+              </a:defRPr>
+            </a:lvl3pPr>
+            <a:lvl4pPr algn="ctr" rtl="0" eaLnBrk="1" fontAlgn="base" hangingPunct="1">
+              <a:spcBef>
+                <a:spcPct val="0"/>
+              </a:spcBef>
+              <a:spcAft>
+                <a:spcPct val="0"/>
+              </a:spcAft>
+              <a:defRPr sz="4400">
+                <a:solidFill>
+                  <a:schemeClr val="tx2"/>
+                </a:solidFill>
+                <a:latin typeface="Arial" panose="020B0604020202020204" pitchFamily="34" charset="0"/>
+                <a:cs typeface="Arial" panose="020B0604020202020204" pitchFamily="34" charset="0"/>
+              </a:defRPr>
+            </a:lvl4pPr>
+            <a:lvl5pPr algn="ctr" rtl="0" eaLnBrk="1" fontAlgn="base" hangingPunct="1">
+              <a:spcBef>
+                <a:spcPct val="0"/>
+              </a:spcBef>
+              <a:spcAft>
+                <a:spcPct val="0"/>
+              </a:spcAft>
+              <a:defRPr sz="4400">
+                <a:solidFill>
+                  <a:schemeClr val="tx2"/>
+                </a:solidFill>
+                <a:latin typeface="Arial" panose="020B0604020202020204" pitchFamily="34" charset="0"/>
+                <a:cs typeface="Arial" panose="020B0604020202020204" pitchFamily="34" charset="0"/>
+              </a:defRPr>
+            </a:lvl5pPr>
+            <a:lvl6pPr marL="457200" algn="ctr" rtl="0" eaLnBrk="1" fontAlgn="base" hangingPunct="1">
+              <a:spcBef>
+                <a:spcPct val="0"/>
+              </a:spcBef>
+              <a:spcAft>
+                <a:spcPct val="0"/>
+              </a:spcAft>
+              <a:defRPr sz="4400">
+                <a:solidFill>
+                  <a:schemeClr val="tx2"/>
+                </a:solidFill>
+                <a:latin typeface="Arial" panose="020B0604020202020204" pitchFamily="34" charset="0"/>
+                <a:cs typeface="Arial" panose="020B0604020202020204" pitchFamily="34" charset="0"/>
+              </a:defRPr>
+            </a:lvl6pPr>
+            <a:lvl7pPr marL="914400" algn="ctr" rtl="0" eaLnBrk="1" fontAlgn="base" hangingPunct="1">
+              <a:spcBef>
+                <a:spcPct val="0"/>
+              </a:spcBef>
+              <a:spcAft>
+                <a:spcPct val="0"/>
+              </a:spcAft>
+              <a:defRPr sz="4400">
+                <a:solidFill>
+                  <a:schemeClr val="tx2"/>
+                </a:solidFill>
+                <a:latin typeface="Arial" panose="020B0604020202020204" pitchFamily="34" charset="0"/>
+                <a:cs typeface="Arial" panose="020B0604020202020204" pitchFamily="34" charset="0"/>
+              </a:defRPr>
+            </a:lvl7pPr>
+            <a:lvl8pPr marL="1371600" algn="ctr" rtl="0" eaLnBrk="1" fontAlgn="base" hangingPunct="1">
+              <a:spcBef>
+                <a:spcPct val="0"/>
+              </a:spcBef>
+              <a:spcAft>
+                <a:spcPct val="0"/>
+              </a:spcAft>
+              <a:defRPr sz="4400">
+                <a:solidFill>
+                  <a:schemeClr val="tx2"/>
+                </a:solidFill>
+                <a:latin typeface="Arial" panose="020B0604020202020204" pitchFamily="34" charset="0"/>
+                <a:cs typeface="Arial" panose="020B0604020202020204" pitchFamily="34" charset="0"/>
+              </a:defRPr>
+            </a:lvl8pPr>
+            <a:lvl9pPr marL="1828800" algn="ctr" rtl="0" eaLnBrk="1" fontAlgn="base" hangingPunct="1">
+              <a:spcBef>
+                <a:spcPct val="0"/>
+              </a:spcBef>
+              <a:spcAft>
+                <a:spcPct val="0"/>
+              </a:spcAft>
+              <a:defRPr sz="4400">
+                <a:solidFill>
+                  <a:schemeClr val="tx2"/>
+                </a:solidFill>
+                <a:latin typeface="Arial" panose="020B0604020202020204" pitchFamily="34" charset="0"/>
+                <a:cs typeface="Arial" panose="020B0604020202020204" pitchFamily="34" charset="0"/>
+              </a:defRPr>
+            </a:lvl9pPr>
+          </a:lstStyle>
+          <a:p>
+            <a:r>
+              <a:rPr lang="en-US" sz="3600" b="1" i="1" dirty="0">
+                <a:solidFill>
+                  <a:srgbClr val="FFC000"/>
+                </a:solidFill>
+              </a:rPr>
+              <a:t>Climate Anomalies</a:t>
+            </a:r>
+          </a:p>
+        </p:txBody>
+      </p:sp>
+    </p:spTree>
+    <p:extLst>
+      <p:ext uri="{BB962C8B-B14F-4D97-AF65-F5344CB8AC3E}">
+        <p14:creationId xmlns:p14="http://schemas.microsoft.com/office/powerpoint/2010/main" val="3025043715"/>
+      </p:ext>
+    </p:extLst>
+  </p:cSld>
+  <p:clrMapOvr>
+    <a:masterClrMapping/>
+  </p:clrMapOvr>
+</p:sld>
+</file>
+
+<file path=ppt/slides/slide4.xml><?xml version="1.0" encoding="utf-8"?>
+<p:sld xmlns:a="http://schemas.openxmlformats.org/drawingml/2006/main" xmlns:r="http://schemas.openxmlformats.org/officeDocument/2006/relationships" xmlns:p="http://schemas.openxmlformats.org/presentationml/2006/main">
+  <p:cSld>
+    <p:spTree>
+      <p:nvGrpSpPr>
+        <p:cNvPr id="1" name=""/>
+        <p:cNvGrpSpPr/>
+        <p:nvPr/>
+      </p:nvGrpSpPr>
+      <p:grpSpPr>
+        <a:xfrm>
+          <a:off x="0" y="0"/>
+          <a:ext cx="0" cy="0"/>
+          <a:chOff x="0" y="0"/>
+          <a:chExt cx="0" cy="0"/>
+        </a:xfrm>
+      </p:grpSpPr>
+      <p:sp>
+        <p:nvSpPr>
+          <p:cNvPr id="2" name="Rectangle 1">
+            <a:extLst>
+              <a:ext uri="{FF2B5EF4-FFF2-40B4-BE49-F238E27FC236}">
+                <a16:creationId xmlns:a16="http://schemas.microsoft.com/office/drawing/2014/main" id="{10BD4455-CDCB-401F-8DEF-88D95727D9C4}"/>
+              </a:ext>
+            </a:extLst>
+          </p:cNvPr>
+          <p:cNvSpPr/>
+          <p:nvPr/>
+        </p:nvSpPr>
+        <p:spPr>
+          <a:xfrm>
+            <a:off x="461645" y="4660904"/>
+            <a:ext cx="2364750" cy="369332"/>
+          </a:xfrm>
+          <a:prstGeom prst="rect">
+            <a:avLst/>
+          </a:prstGeom>
+        </p:spPr>
+        <p:txBody>
+          <a:bodyPr wrap="none">
+            <a:spAutoFit/>
+          </a:bodyPr>
+          <a:lstStyle/>
+          <a:p>
+            <a:r>
+              <a:rPr lang="en-US" dirty="0">
+                <a:hlinkClick r:id="rId2"/>
+              </a:rPr>
+              <a:t>http://127.0.0.1:5000/</a:t>
+            </a:r>
+            <a:endParaRPr lang="en-US" dirty="0"/>
+          </a:p>
+        </p:txBody>
+      </p:sp>
+      <p:pic>
+        <p:nvPicPr>
+          <p:cNvPr id="4" name="Picture 3">
+            <a:extLst>
+              <a:ext uri="{FF2B5EF4-FFF2-40B4-BE49-F238E27FC236}">
+                <a16:creationId xmlns:a16="http://schemas.microsoft.com/office/drawing/2014/main" id="{F99AC917-8D39-444C-B4F4-F335073D9E33}"/>
+              </a:ext>
+            </a:extLst>
+          </p:cNvPr>
+          <p:cNvPicPr>
+            <a:picLocks noChangeAspect="1"/>
+          </p:cNvPicPr>
+          <p:nvPr/>
+        </p:nvPicPr>
+        <p:blipFill>
+          <a:blip r:embed="rId3"/>
+          <a:stretch>
+            <a:fillRect/>
+          </a:stretch>
+        </p:blipFill>
+        <p:spPr>
+          <a:xfrm>
+            <a:off x="5692140" y="4070608"/>
+            <a:ext cx="5785819" cy="2409825"/>
+          </a:xfrm>
+          <a:prstGeom prst="rect">
+            <a:avLst/>
+          </a:prstGeom>
+        </p:spPr>
+      </p:pic>
+      <p:pic>
+        <p:nvPicPr>
+          <p:cNvPr id="9" name="Picture 8">
+            <a:extLst>
+              <a:ext uri="{FF2B5EF4-FFF2-40B4-BE49-F238E27FC236}">
+                <a16:creationId xmlns:a16="http://schemas.microsoft.com/office/drawing/2014/main" id="{97075C4E-DEC9-419B-9D29-E98B1C505CCE}"/>
+              </a:ext>
+            </a:extLst>
+          </p:cNvPr>
+          <p:cNvPicPr>
+            <a:picLocks noChangeAspect="1"/>
+          </p:cNvPicPr>
+          <p:nvPr/>
+        </p:nvPicPr>
+        <p:blipFill>
+          <a:blip r:embed="rId4"/>
+          <a:stretch>
+            <a:fillRect/>
+          </a:stretch>
+        </p:blipFill>
+        <p:spPr>
+          <a:xfrm>
+            <a:off x="461645" y="691358"/>
+            <a:ext cx="5176369" cy="3790950"/>
+          </a:xfrm>
+          <a:prstGeom prst="rect">
+            <a:avLst/>
+          </a:prstGeom>
+        </p:spPr>
+      </p:pic>
+      <p:pic>
+        <p:nvPicPr>
+          <p:cNvPr id="5" name="Picture 4">
+            <a:extLst>
+              <a:ext uri="{FF2B5EF4-FFF2-40B4-BE49-F238E27FC236}">
+                <a16:creationId xmlns:a16="http://schemas.microsoft.com/office/drawing/2014/main" id="{C8832E6C-9D53-4DB9-A0AB-F8735157678E}"/>
+              </a:ext>
+            </a:extLst>
+          </p:cNvPr>
+          <p:cNvPicPr>
+            <a:picLocks noChangeAspect="1"/>
+          </p:cNvPicPr>
+          <p:nvPr/>
+        </p:nvPicPr>
+        <p:blipFill>
+          <a:blip r:embed="rId5"/>
+          <a:stretch>
+            <a:fillRect/>
+          </a:stretch>
+        </p:blipFill>
+        <p:spPr>
+          <a:xfrm>
+            <a:off x="5692140" y="691358"/>
+            <a:ext cx="5477136" cy="3267075"/>
+          </a:xfrm>
+          <a:prstGeom prst="rect">
+            <a:avLst/>
+          </a:prstGeom>
+        </p:spPr>
+      </p:pic>
+      <p:sp>
+        <p:nvSpPr>
+          <p:cNvPr id="14" name="Title 1">
+            <a:extLst>
+              <a:ext uri="{FF2B5EF4-FFF2-40B4-BE49-F238E27FC236}">
+                <a16:creationId xmlns:a16="http://schemas.microsoft.com/office/drawing/2014/main" id="{B2C66684-8263-4F4D-AFDF-AE1212939723}"/>
+              </a:ext>
+            </a:extLst>
+          </p:cNvPr>
+          <p:cNvSpPr txBox="1">
+            <a:spLocks/>
+          </p:cNvSpPr>
+          <p:nvPr/>
+        </p:nvSpPr>
+        <p:spPr>
+          <a:xfrm>
+            <a:off x="609600" y="0"/>
+            <a:ext cx="10972800" cy="512762"/>
+          </a:xfrm>
+          <a:prstGeom prst="rect">
+            <a:avLst/>
+          </a:prstGeom>
+        </p:spPr>
+        <p:txBody>
+          <a:bodyPr/>
+          <a:lstStyle>
+            <a:lvl1pPr algn="ctr" rtl="0" eaLnBrk="1" fontAlgn="base" hangingPunct="1">
+              <a:spcBef>
+                <a:spcPct val="0"/>
+              </a:spcBef>
+              <a:spcAft>
+                <a:spcPct val="0"/>
+              </a:spcAft>
+              <a:defRPr sz="4400" kern="1200">
+                <a:solidFill>
+                  <a:schemeClr val="tx2"/>
+                </a:solidFill>
+                <a:latin typeface="+mj-lt"/>
+                <a:ea typeface="+mj-ea"/>
+                <a:cs typeface="+mj-cs"/>
+              </a:defRPr>
+            </a:lvl1pPr>
+            <a:lvl2pPr algn="ctr" rtl="0" eaLnBrk="1" fontAlgn="base" hangingPunct="1">
+              <a:spcBef>
+                <a:spcPct val="0"/>
+              </a:spcBef>
+              <a:spcAft>
+                <a:spcPct val="0"/>
+              </a:spcAft>
+              <a:defRPr sz="4400">
+                <a:solidFill>
+                  <a:schemeClr val="tx2"/>
+                </a:solidFill>
+                <a:latin typeface="Arial" panose="020B0604020202020204" pitchFamily="34" charset="0"/>
+                <a:cs typeface="Arial" panose="020B0604020202020204" pitchFamily="34" charset="0"/>
+              </a:defRPr>
+            </a:lvl2pPr>
+            <a:lvl3pPr algn="ctr" rtl="0" eaLnBrk="1" fontAlgn="base" hangingPunct="1">
+              <a:spcBef>
+                <a:spcPct val="0"/>
+              </a:spcBef>
+              <a:spcAft>
+                <a:spcPct val="0"/>
+              </a:spcAft>
+              <a:defRPr sz="4400">
+                <a:solidFill>
+                  <a:schemeClr val="tx2"/>
+                </a:solidFill>
+                <a:latin typeface="Arial" panose="020B0604020202020204" pitchFamily="34" charset="0"/>
+                <a:cs typeface="Arial" panose="020B0604020202020204" pitchFamily="34" charset="0"/>
+              </a:defRPr>
+            </a:lvl3pPr>
+            <a:lvl4pPr algn="ctr" rtl="0" eaLnBrk="1" fontAlgn="base" hangingPunct="1">
+              <a:spcBef>
+                <a:spcPct val="0"/>
+              </a:spcBef>
+              <a:spcAft>
+                <a:spcPct val="0"/>
+              </a:spcAft>
+              <a:defRPr sz="4400">
+                <a:solidFill>
+                  <a:schemeClr val="tx2"/>
+                </a:solidFill>
+                <a:latin typeface="Arial" panose="020B0604020202020204" pitchFamily="34" charset="0"/>
+                <a:cs typeface="Arial" panose="020B0604020202020204" pitchFamily="34" charset="0"/>
+              </a:defRPr>
+            </a:lvl4pPr>
+            <a:lvl5pPr algn="ctr" rtl="0" eaLnBrk="1" fontAlgn="base" hangingPunct="1">
+              <a:spcBef>
+                <a:spcPct val="0"/>
+              </a:spcBef>
+              <a:spcAft>
+                <a:spcPct val="0"/>
+              </a:spcAft>
+              <a:defRPr sz="4400">
+                <a:solidFill>
+                  <a:schemeClr val="tx2"/>
+                </a:solidFill>
+                <a:latin typeface="Arial" panose="020B0604020202020204" pitchFamily="34" charset="0"/>
+                <a:cs typeface="Arial" panose="020B0604020202020204" pitchFamily="34" charset="0"/>
+              </a:defRPr>
+            </a:lvl5pPr>
+            <a:lvl6pPr marL="457200" algn="ctr" rtl="0" eaLnBrk="1" fontAlgn="base" hangingPunct="1">
+              <a:spcBef>
+                <a:spcPct val="0"/>
+              </a:spcBef>
+              <a:spcAft>
+                <a:spcPct val="0"/>
+              </a:spcAft>
+              <a:defRPr sz="4400">
+                <a:solidFill>
+                  <a:schemeClr val="tx2"/>
+                </a:solidFill>
+                <a:latin typeface="Arial" panose="020B0604020202020204" pitchFamily="34" charset="0"/>
+                <a:cs typeface="Arial" panose="020B0604020202020204" pitchFamily="34" charset="0"/>
+              </a:defRPr>
+            </a:lvl6pPr>
+            <a:lvl7pPr marL="914400" algn="ctr" rtl="0" eaLnBrk="1" fontAlgn="base" hangingPunct="1">
+              <a:spcBef>
+                <a:spcPct val="0"/>
+              </a:spcBef>
+              <a:spcAft>
+                <a:spcPct val="0"/>
+              </a:spcAft>
+              <a:defRPr sz="4400">
+                <a:solidFill>
+                  <a:schemeClr val="tx2"/>
+                </a:solidFill>
+                <a:latin typeface="Arial" panose="020B0604020202020204" pitchFamily="34" charset="0"/>
+                <a:cs typeface="Arial" panose="020B0604020202020204" pitchFamily="34" charset="0"/>
+              </a:defRPr>
+            </a:lvl7pPr>
+            <a:lvl8pPr marL="1371600" algn="ctr" rtl="0" eaLnBrk="1" fontAlgn="base" hangingPunct="1">
+              <a:spcBef>
+                <a:spcPct val="0"/>
+              </a:spcBef>
+              <a:spcAft>
+                <a:spcPct val="0"/>
+              </a:spcAft>
+              <a:defRPr sz="4400">
+                <a:solidFill>
+                  <a:schemeClr val="tx2"/>
+                </a:solidFill>
+                <a:latin typeface="Arial" panose="020B0604020202020204" pitchFamily="34" charset="0"/>
+                <a:cs typeface="Arial" panose="020B0604020202020204" pitchFamily="34" charset="0"/>
+              </a:defRPr>
+            </a:lvl8pPr>
+            <a:lvl9pPr marL="1828800" algn="ctr" rtl="0" eaLnBrk="1" fontAlgn="base" hangingPunct="1">
+              <a:spcBef>
+                <a:spcPct val="0"/>
+              </a:spcBef>
+              <a:spcAft>
+                <a:spcPct val="0"/>
+              </a:spcAft>
+              <a:defRPr sz="4400">
+                <a:solidFill>
+                  <a:schemeClr val="tx2"/>
+                </a:solidFill>
+                <a:latin typeface="Arial" panose="020B0604020202020204" pitchFamily="34" charset="0"/>
+                <a:cs typeface="Arial" panose="020B0604020202020204" pitchFamily="34" charset="0"/>
+              </a:defRPr>
+            </a:lvl9pPr>
+          </a:lstStyle>
+          <a:p>
+            <a:r>
+              <a:rPr lang="en-US" sz="3600" b="1" i="1" dirty="0">
+                <a:solidFill>
+                  <a:srgbClr val="FFC000"/>
+                </a:solidFill>
+              </a:rPr>
+              <a:t>Climate Anomalies</a:t>
+            </a:r>
+          </a:p>
+        </p:txBody>
+      </p:sp>
+    </p:spTree>
+    <p:extLst>
+      <p:ext uri="{BB962C8B-B14F-4D97-AF65-F5344CB8AC3E}">
+        <p14:creationId xmlns:p14="http://schemas.microsoft.com/office/powerpoint/2010/main" val="2707112248"/>
       </p:ext>
     </p:extLst>
   </p:cSld>

</xml_diff>